<commit_message>
Updated data and scripts for experimental graphs
</commit_message>
<xml_diff>
--- a/plots/Images.pptx
+++ b/plots/Images.pptx
@@ -7,10 +7,12 @@
   <p:sldIdLst>
     <p:sldId id="256" r:id="rId2"/>
     <p:sldId id="257" r:id="rId3"/>
-    <p:sldId id="258" r:id="rId4"/>
-    <p:sldId id="261" r:id="rId5"/>
-    <p:sldId id="259" r:id="rId6"/>
-    <p:sldId id="260" r:id="rId7"/>
+    <p:sldId id="263" r:id="rId4"/>
+    <p:sldId id="258" r:id="rId5"/>
+    <p:sldId id="261" r:id="rId6"/>
+    <p:sldId id="259" r:id="rId7"/>
+    <p:sldId id="260" r:id="rId8"/>
+    <p:sldId id="262" r:id="rId9"/>
   </p:sldIdLst>
   <p:sldSz cx="12192000" cy="6858000"/>
   <p:notesSz cx="6858000" cy="9144000"/>
@@ -5868,7 +5870,7 @@
             <a:pPr algn="ctr"/>
             <a:r>
               <a:rPr lang="en-US" sz="1400" dirty="0"/>
-              <a:t>Processor 1</a:t>
+              <a:t>Process 1</a:t>
             </a:r>
           </a:p>
         </p:txBody>
@@ -5904,7 +5906,7 @@
             <a:pPr algn="ctr"/>
             <a:r>
               <a:rPr lang="en-US" sz="1400" dirty="0"/>
-              <a:t>Processor 2</a:t>
+              <a:t>Process 2</a:t>
             </a:r>
           </a:p>
         </p:txBody>
@@ -5940,7 +5942,7 @@
             <a:pPr algn="ctr"/>
             <a:r>
               <a:rPr lang="en-US" sz="1400" dirty="0"/>
-              <a:t>Processor 3</a:t>
+              <a:t>Process 3</a:t>
             </a:r>
           </a:p>
         </p:txBody>
@@ -5959,6 +5961,1907 @@
 </file>
 
 <file path=ppt/slides/slide3.xml><?xml version="1.0" encoding="utf-8"?>
+<p:sld xmlns:a="http://schemas.openxmlformats.org/drawingml/2006/main" xmlns:r="http://schemas.openxmlformats.org/officeDocument/2006/relationships" xmlns:p="http://schemas.openxmlformats.org/presentationml/2006/main">
+  <p:cSld>
+    <p:spTree>
+      <p:nvGrpSpPr>
+        <p:cNvPr id="1" name=""/>
+        <p:cNvGrpSpPr/>
+        <p:nvPr/>
+      </p:nvGrpSpPr>
+      <p:grpSpPr>
+        <a:xfrm>
+          <a:off x="0" y="0"/>
+          <a:ext cx="0" cy="0"/>
+          <a:chOff x="0" y="0"/>
+          <a:chExt cx="0" cy="0"/>
+        </a:xfrm>
+      </p:grpSpPr>
+      <p:sp>
+        <p:nvSpPr>
+          <p:cNvPr id="4" name="Rectangle 3">
+            <a:extLst>
+              <a:ext uri="{FF2B5EF4-FFF2-40B4-BE49-F238E27FC236}">
+                <a16:creationId xmlns:a16="http://schemas.microsoft.com/office/drawing/2014/main" id="{19A831DE-CFB0-47F8-8BD2-E3DD4A86865E}"/>
+              </a:ext>
+            </a:extLst>
+          </p:cNvPr>
+          <p:cNvSpPr/>
+          <p:nvPr/>
+        </p:nvSpPr>
+        <p:spPr>
+          <a:xfrm>
+            <a:off x="1737360" y="681038"/>
+            <a:ext cx="7188926" cy="3200929"/>
+          </a:xfrm>
+          <a:prstGeom prst="rect">
+            <a:avLst/>
+          </a:prstGeom>
+          <a:noFill/>
+          <a:ln>
+            <a:solidFill>
+              <a:schemeClr val="tx1"/>
+            </a:solidFill>
+          </a:ln>
+        </p:spPr>
+        <p:style>
+          <a:lnRef idx="2">
+            <a:schemeClr val="accent1">
+              <a:shade val="50000"/>
+            </a:schemeClr>
+          </a:lnRef>
+          <a:fillRef idx="1">
+            <a:schemeClr val="accent1"/>
+          </a:fillRef>
+          <a:effectRef idx="0">
+            <a:schemeClr val="accent1"/>
+          </a:effectRef>
+          <a:fontRef idx="minor">
+            <a:schemeClr val="lt1"/>
+          </a:fontRef>
+        </p:style>
+        <p:txBody>
+          <a:bodyPr rtlCol="0" anchor="ctr"/>
+          <a:lstStyle/>
+          <a:p>
+            <a:pPr algn="ctr"/>
+            <a:endParaRPr lang="en-US"/>
+          </a:p>
+        </p:txBody>
+      </p:sp>
+      <p:sp>
+        <p:nvSpPr>
+          <p:cNvPr id="5" name="Rectangle 4">
+            <a:extLst>
+              <a:ext uri="{FF2B5EF4-FFF2-40B4-BE49-F238E27FC236}">
+                <a16:creationId xmlns:a16="http://schemas.microsoft.com/office/drawing/2014/main" id="{D83A6AAE-6553-411A-8038-1DC9B266F9C6}"/>
+              </a:ext>
+            </a:extLst>
+          </p:cNvPr>
+          <p:cNvSpPr/>
+          <p:nvPr/>
+        </p:nvSpPr>
+        <p:spPr>
+          <a:xfrm>
+            <a:off x="4347337" y="1162168"/>
+            <a:ext cx="1904873" cy="2444731"/>
+          </a:xfrm>
+          <a:prstGeom prst="rect">
+            <a:avLst/>
+          </a:prstGeom>
+          <a:noFill/>
+          <a:ln>
+            <a:solidFill>
+              <a:schemeClr val="tx1"/>
+            </a:solidFill>
+          </a:ln>
+        </p:spPr>
+        <p:style>
+          <a:lnRef idx="2">
+            <a:schemeClr val="accent1">
+              <a:shade val="50000"/>
+            </a:schemeClr>
+          </a:lnRef>
+          <a:fillRef idx="1">
+            <a:schemeClr val="accent1"/>
+          </a:fillRef>
+          <a:effectRef idx="0">
+            <a:schemeClr val="accent1"/>
+          </a:effectRef>
+          <a:fontRef idx="minor">
+            <a:schemeClr val="lt1"/>
+          </a:fontRef>
+        </p:style>
+        <p:txBody>
+          <a:bodyPr rtlCol="0" anchor="ctr"/>
+          <a:lstStyle/>
+          <a:p>
+            <a:pPr algn="ctr"/>
+            <a:endParaRPr lang="en-US"/>
+          </a:p>
+        </p:txBody>
+      </p:sp>
+      <p:grpSp>
+        <p:nvGrpSpPr>
+          <p:cNvPr id="22" name="Group 21">
+            <a:extLst>
+              <a:ext uri="{FF2B5EF4-FFF2-40B4-BE49-F238E27FC236}">
+                <a16:creationId xmlns:a16="http://schemas.microsoft.com/office/drawing/2014/main" id="{8E5ACD87-1BB6-4C86-A82E-7EEB38C7EB2B}"/>
+              </a:ext>
+            </a:extLst>
+          </p:cNvPr>
+          <p:cNvGrpSpPr/>
+          <p:nvPr/>
+        </p:nvGrpSpPr>
+        <p:grpSpPr>
+          <a:xfrm>
+            <a:off x="4420815" y="1277547"/>
+            <a:ext cx="325728" cy="227036"/>
+            <a:chOff x="4534126" y="1606550"/>
+            <a:chExt cx="284109" cy="246221"/>
+          </a:xfrm>
+        </p:grpSpPr>
+        <p:sp>
+          <p:nvSpPr>
+            <p:cNvPr id="23" name="TextBox 22">
+              <a:extLst>
+                <a:ext uri="{FF2B5EF4-FFF2-40B4-BE49-F238E27FC236}">
+                  <a16:creationId xmlns:a16="http://schemas.microsoft.com/office/drawing/2014/main" id="{80463819-FB24-416A-9432-F55061381084}"/>
+                </a:ext>
+              </a:extLst>
+            </p:cNvPr>
+            <p:cNvSpPr txBox="1"/>
+            <p:nvPr/>
+          </p:nvSpPr>
+          <p:spPr>
+            <a:xfrm>
+              <a:off x="4534126" y="1606550"/>
+              <a:ext cx="284109" cy="246221"/>
+            </a:xfrm>
+            <a:prstGeom prst="rect">
+              <a:avLst/>
+            </a:prstGeom>
+            <a:noFill/>
+          </p:spPr>
+          <p:txBody>
+            <a:bodyPr wrap="square" rtlCol="0">
+              <a:spAutoFit/>
+            </a:bodyPr>
+            <a:lstStyle/>
+            <a:p>
+              <a:pPr algn="ctr"/>
+              <a:r>
+                <a:rPr lang="en-US" sz="1000" dirty="0"/>
+                <a:t>s</a:t>
+              </a:r>
+              <a:r>
+                <a:rPr lang="en-US" sz="1000" baseline="-25000" dirty="0"/>
+                <a:t>2</a:t>
+              </a:r>
+              <a:endParaRPr lang="en-US" sz="1000" dirty="0"/>
+            </a:p>
+          </p:txBody>
+        </p:sp>
+        <p:sp>
+          <p:nvSpPr>
+            <p:cNvPr id="24" name="Rectangle 23">
+              <a:extLst>
+                <a:ext uri="{FF2B5EF4-FFF2-40B4-BE49-F238E27FC236}">
+                  <a16:creationId xmlns:a16="http://schemas.microsoft.com/office/drawing/2014/main" id="{9A38B750-477F-436D-8BD5-2D551BDBA00D}"/>
+                </a:ext>
+              </a:extLst>
+            </p:cNvPr>
+            <p:cNvSpPr/>
+            <p:nvPr/>
+          </p:nvSpPr>
+          <p:spPr>
+            <a:xfrm>
+              <a:off x="4534127" y="1619252"/>
+              <a:ext cx="266701" cy="230832"/>
+            </a:xfrm>
+            <a:prstGeom prst="rect">
+              <a:avLst/>
+            </a:prstGeom>
+            <a:noFill/>
+            <a:ln>
+              <a:solidFill>
+                <a:schemeClr val="tx1"/>
+              </a:solidFill>
+            </a:ln>
+          </p:spPr>
+          <p:style>
+            <a:lnRef idx="2">
+              <a:schemeClr val="accent1">
+                <a:shade val="50000"/>
+              </a:schemeClr>
+            </a:lnRef>
+            <a:fillRef idx="1">
+              <a:schemeClr val="accent1"/>
+            </a:fillRef>
+            <a:effectRef idx="0">
+              <a:schemeClr val="accent1"/>
+            </a:effectRef>
+            <a:fontRef idx="minor">
+              <a:schemeClr val="lt1"/>
+            </a:fontRef>
+          </p:style>
+          <p:txBody>
+            <a:bodyPr rtlCol="0" anchor="ctr"/>
+            <a:lstStyle/>
+            <a:p>
+              <a:pPr algn="ctr"/>
+              <a:endParaRPr lang="en-US" dirty="0"/>
+            </a:p>
+          </p:txBody>
+        </p:sp>
+      </p:grpSp>
+      <p:cxnSp>
+        <p:nvCxnSpPr>
+          <p:cNvPr id="25" name="Straight Arrow Connector 24">
+            <a:extLst>
+              <a:ext uri="{FF2B5EF4-FFF2-40B4-BE49-F238E27FC236}">
+                <a16:creationId xmlns:a16="http://schemas.microsoft.com/office/drawing/2014/main" id="{7B73E245-110F-43E3-8BED-666898919FEF}"/>
+              </a:ext>
+            </a:extLst>
+          </p:cNvPr>
+          <p:cNvCxnSpPr>
+            <a:cxnSpLocks/>
+          </p:cNvCxnSpPr>
+          <p:nvPr/>
+        </p:nvCxnSpPr>
+        <p:spPr>
+          <a:xfrm>
+            <a:off x="4726586" y="1381044"/>
+            <a:ext cx="315312" cy="0"/>
+          </a:xfrm>
+          <a:prstGeom prst="straightConnector1">
+            <a:avLst/>
+          </a:prstGeom>
+          <a:ln w="12700">
+            <a:tailEnd type="triangle"/>
+          </a:ln>
+        </p:spPr>
+        <p:style>
+          <a:lnRef idx="1">
+            <a:schemeClr val="dk1"/>
+          </a:lnRef>
+          <a:fillRef idx="0">
+            <a:schemeClr val="dk1"/>
+          </a:fillRef>
+          <a:effectRef idx="0">
+            <a:schemeClr val="dk1"/>
+          </a:effectRef>
+          <a:fontRef idx="minor">
+            <a:schemeClr val="tx1"/>
+          </a:fontRef>
+        </p:style>
+      </p:cxnSp>
+      <p:graphicFrame>
+        <p:nvGraphicFramePr>
+          <p:cNvPr id="26" name="Content Placeholder 14">
+            <a:extLst>
+              <a:ext uri="{FF2B5EF4-FFF2-40B4-BE49-F238E27FC236}">
+                <a16:creationId xmlns:a16="http://schemas.microsoft.com/office/drawing/2014/main" id="{5781214B-050E-4444-A116-A4EBB5C24D3D}"/>
+              </a:ext>
+            </a:extLst>
+          </p:cNvPr>
+          <p:cNvGraphicFramePr>
+            <a:graphicFrameLocks/>
+          </p:cNvGraphicFramePr>
+          <p:nvPr>
+            <p:extLst>
+              <p:ext uri="{D42A27DB-BD31-4B8C-83A1-F6EECF244321}">
+                <p14:modId xmlns:p14="http://schemas.microsoft.com/office/powerpoint/2010/main" val="917008016"/>
+              </p:ext>
+            </p:extLst>
+          </p:nvPr>
+        </p:nvGraphicFramePr>
+        <p:xfrm>
+          <a:off x="5048055" y="1266726"/>
+          <a:ext cx="1116778" cy="822960"/>
+        </p:xfrm>
+        <a:graphic>
+          <a:graphicData uri="http://schemas.openxmlformats.org/drawingml/2006/table">
+            <a:tbl>
+              <a:tblPr firstRow="1" bandRow="1">
+                <a:tableStyleId>{5940675A-B579-460E-94D1-54222C63F5DA}</a:tableStyleId>
+              </a:tblPr>
+              <a:tblGrid>
+                <a:gridCol w="558389">
+                  <a:extLst>
+                    <a:ext uri="{9D8B030D-6E8A-4147-A177-3AD203B41FA5}">
+                      <a16:colId xmlns:a16="http://schemas.microsoft.com/office/drawing/2014/main" val="2645091282"/>
+                    </a:ext>
+                  </a:extLst>
+                </a:gridCol>
+                <a:gridCol w="558389">
+                  <a:extLst>
+                    <a:ext uri="{9D8B030D-6E8A-4147-A177-3AD203B41FA5}">
+                      <a16:colId xmlns:a16="http://schemas.microsoft.com/office/drawing/2014/main" val="2668859156"/>
+                    </a:ext>
+                  </a:extLst>
+                </a:gridCol>
+              </a:tblGrid>
+              <a:tr h="186540">
+                <a:tc>
+                  <a:txBody>
+                    <a:bodyPr/>
+                    <a:lstStyle/>
+                    <a:p>
+                      <a:pPr algn="ctr"/>
+                      <a:r>
+                        <a:rPr lang="en-US" sz="1200" dirty="0"/>
+                        <a:t>s</a:t>
+                      </a:r>
+                      <a:r>
+                        <a:rPr lang="en-US" sz="1200" baseline="-25000" dirty="0"/>
+                        <a:t>1</a:t>
+                      </a:r>
+                      <a:endParaRPr lang="en-US" dirty="0"/>
+                    </a:p>
+                  </a:txBody>
+                  <a:tcPr/>
+                </a:tc>
+                <a:tc>
+                  <a:txBody>
+                    <a:bodyPr/>
+                    <a:lstStyle/>
+                    <a:p>
+                      <a:pPr algn="ctr"/>
+                      <a:r>
+                        <a:rPr lang="en-US" sz="1200" dirty="0"/>
+                        <a:t>3</a:t>
+                      </a:r>
+                    </a:p>
+                  </a:txBody>
+                  <a:tcPr/>
+                </a:tc>
+                <a:extLst>
+                  <a:ext uri="{0D108BD9-81ED-4DB2-BD59-A6C34878D82A}">
+                    <a16:rowId xmlns:a16="http://schemas.microsoft.com/office/drawing/2014/main" val="2052664713"/>
+                  </a:ext>
+                </a:extLst>
+              </a:tr>
+              <a:tr h="182880">
+                <a:tc>
+                  <a:txBody>
+                    <a:bodyPr/>
+                    <a:lstStyle/>
+                    <a:p>
+                      <a:pPr marL="0" marR="0" lvl="0" indent="0" algn="ctr" defTabSz="914400" rtl="0" eaLnBrk="1" fontAlgn="auto" latinLnBrk="0" hangingPunct="1">
+                        <a:lnSpc>
+                          <a:spcPct val="100000"/>
+                        </a:lnSpc>
+                        <a:spcBef>
+                          <a:spcPts val="0"/>
+                        </a:spcBef>
+                        <a:spcAft>
+                          <a:spcPts val="0"/>
+                        </a:spcAft>
+                        <a:buClrTx/>
+                        <a:buSzTx/>
+                        <a:buFontTx/>
+                        <a:buNone/>
+                        <a:tabLst/>
+                        <a:defRPr/>
+                      </a:pPr>
+                      <a:r>
+                        <a:rPr lang="en-US" sz="1200" dirty="0"/>
+                        <a:t>s</a:t>
+                      </a:r>
+                      <a:r>
+                        <a:rPr lang="en-US" sz="1200" baseline="-25000" dirty="0"/>
+                        <a:t>3</a:t>
+                      </a:r>
+                      <a:endParaRPr lang="en-US" dirty="0"/>
+                    </a:p>
+                  </a:txBody>
+                  <a:tcPr/>
+                </a:tc>
+                <a:tc>
+                  <a:txBody>
+                    <a:bodyPr/>
+                    <a:lstStyle/>
+                    <a:p>
+                      <a:pPr algn="ctr"/>
+                      <a:r>
+                        <a:rPr lang="en-US" sz="1200" dirty="0"/>
+                        <a:t>1</a:t>
+                      </a:r>
+                    </a:p>
+                  </a:txBody>
+                  <a:tcPr/>
+                </a:tc>
+                <a:extLst>
+                  <a:ext uri="{0D108BD9-81ED-4DB2-BD59-A6C34878D82A}">
+                    <a16:rowId xmlns:a16="http://schemas.microsoft.com/office/drawing/2014/main" val="2622467470"/>
+                  </a:ext>
+                </a:extLst>
+              </a:tr>
+              <a:tr h="182880">
+                <a:tc>
+                  <a:txBody>
+                    <a:bodyPr/>
+                    <a:lstStyle/>
+                    <a:p>
+                      <a:pPr marL="0" marR="0" lvl="0" indent="0" algn="ctr" defTabSz="914400" rtl="0" eaLnBrk="1" fontAlgn="auto" latinLnBrk="0" hangingPunct="1">
+                        <a:lnSpc>
+                          <a:spcPct val="100000"/>
+                        </a:lnSpc>
+                        <a:spcBef>
+                          <a:spcPts val="0"/>
+                        </a:spcBef>
+                        <a:spcAft>
+                          <a:spcPts val="0"/>
+                        </a:spcAft>
+                        <a:buClrTx/>
+                        <a:buSzTx/>
+                        <a:buFontTx/>
+                        <a:buNone/>
+                        <a:tabLst/>
+                        <a:defRPr/>
+                      </a:pPr>
+                      <a:r>
+                        <a:rPr lang="en-US" sz="1200" dirty="0">
+                          <a:solidFill>
+                            <a:srgbClr val="FF0000"/>
+                          </a:solidFill>
+                        </a:rPr>
+                        <a:t>s</a:t>
+                      </a:r>
+                      <a:r>
+                        <a:rPr lang="en-US" sz="1200" baseline="-25000" dirty="0">
+                          <a:solidFill>
+                            <a:srgbClr val="FF0000"/>
+                          </a:solidFill>
+                        </a:rPr>
+                        <a:t>4 </a:t>
+                      </a:r>
+                      <a:r>
+                        <a:rPr lang="en-US" sz="1200" dirty="0">
+                          <a:solidFill>
+                            <a:srgbClr val="FF0000"/>
+                          </a:solidFill>
+                        </a:rPr>
+                        <a:t>+ s</a:t>
+                      </a:r>
+                      <a:r>
+                        <a:rPr lang="en-US" sz="1200" baseline="-25000" dirty="0">
+                          <a:solidFill>
+                            <a:srgbClr val="FF0000"/>
+                          </a:solidFill>
+                        </a:rPr>
+                        <a:t>5</a:t>
+                      </a:r>
+                      <a:endParaRPr lang="en-US" sz="1200" dirty="0">
+                        <a:solidFill>
+                          <a:srgbClr val="FF0000"/>
+                        </a:solidFill>
+                      </a:endParaRPr>
+                    </a:p>
+                  </a:txBody>
+                  <a:tcPr/>
+                </a:tc>
+                <a:tc>
+                  <a:txBody>
+                    <a:bodyPr/>
+                    <a:lstStyle/>
+                    <a:p>
+                      <a:pPr algn="ctr"/>
+                      <a:r>
+                        <a:rPr lang="en-US" sz="1200" dirty="0"/>
+                        <a:t>0</a:t>
+                      </a:r>
+                    </a:p>
+                  </a:txBody>
+                  <a:tcPr/>
+                </a:tc>
+                <a:extLst>
+                  <a:ext uri="{0D108BD9-81ED-4DB2-BD59-A6C34878D82A}">
+                    <a16:rowId xmlns:a16="http://schemas.microsoft.com/office/drawing/2014/main" val="2452769273"/>
+                  </a:ext>
+                </a:extLst>
+              </a:tr>
+            </a:tbl>
+          </a:graphicData>
+        </a:graphic>
+      </p:graphicFrame>
+      <p:sp>
+        <p:nvSpPr>
+          <p:cNvPr id="32" name="TextBox 31">
+            <a:extLst>
+              <a:ext uri="{FF2B5EF4-FFF2-40B4-BE49-F238E27FC236}">
+                <a16:creationId xmlns:a16="http://schemas.microsoft.com/office/drawing/2014/main" id="{1B41412A-EA24-49F0-BC68-5CADF15C32F8}"/>
+              </a:ext>
+            </a:extLst>
+          </p:cNvPr>
+          <p:cNvSpPr txBox="1"/>
+          <p:nvPr/>
+        </p:nvSpPr>
+        <p:spPr>
+          <a:xfrm>
+            <a:off x="4342499" y="2487826"/>
+            <a:ext cx="492880" cy="246221"/>
+          </a:xfrm>
+          <a:prstGeom prst="rect">
+            <a:avLst/>
+          </a:prstGeom>
+          <a:noFill/>
+        </p:spPr>
+        <p:txBody>
+          <a:bodyPr wrap="square" rtlCol="0">
+            <a:spAutoFit/>
+          </a:bodyPr>
+          <a:lstStyle/>
+          <a:p>
+            <a:pPr algn="ctr"/>
+            <a:r>
+              <a:rPr lang="en-US" sz="1000" dirty="0">
+                <a:solidFill>
+                  <a:srgbClr val="FF0000"/>
+                </a:solidFill>
+              </a:rPr>
+              <a:t>s</a:t>
+            </a:r>
+            <a:r>
+              <a:rPr lang="en-US" sz="1000" baseline="-25000" dirty="0">
+                <a:solidFill>
+                  <a:srgbClr val="FF0000"/>
+                </a:solidFill>
+              </a:rPr>
+              <a:t>4 </a:t>
+            </a:r>
+            <a:r>
+              <a:rPr lang="en-US" sz="1000" dirty="0">
+                <a:solidFill>
+                  <a:srgbClr val="FF0000"/>
+                </a:solidFill>
+              </a:rPr>
+              <a:t>+ s</a:t>
+            </a:r>
+            <a:r>
+              <a:rPr lang="en-US" sz="1000" baseline="-25000" dirty="0">
+                <a:solidFill>
+                  <a:srgbClr val="FF0000"/>
+                </a:solidFill>
+              </a:rPr>
+              <a:t>5</a:t>
+            </a:r>
+            <a:endParaRPr lang="en-US" sz="1000" dirty="0">
+              <a:solidFill>
+                <a:srgbClr val="FF0000"/>
+              </a:solidFill>
+            </a:endParaRPr>
+          </a:p>
+        </p:txBody>
+      </p:sp>
+      <p:sp>
+        <p:nvSpPr>
+          <p:cNvPr id="33" name="Rectangle 32">
+            <a:extLst>
+              <a:ext uri="{FF2B5EF4-FFF2-40B4-BE49-F238E27FC236}">
+                <a16:creationId xmlns:a16="http://schemas.microsoft.com/office/drawing/2014/main" id="{9A29DCD2-029B-4481-8B6E-19D296D4CD78}"/>
+              </a:ext>
+            </a:extLst>
+          </p:cNvPr>
+          <p:cNvSpPr/>
+          <p:nvPr/>
+        </p:nvSpPr>
+        <p:spPr>
+          <a:xfrm>
+            <a:off x="4406900" y="2510215"/>
+            <a:ext cx="362030" cy="223831"/>
+          </a:xfrm>
+          <a:prstGeom prst="rect">
+            <a:avLst/>
+          </a:prstGeom>
+          <a:noFill/>
+          <a:ln>
+            <a:solidFill>
+              <a:schemeClr val="tx1"/>
+            </a:solidFill>
+          </a:ln>
+        </p:spPr>
+        <p:style>
+          <a:lnRef idx="2">
+            <a:schemeClr val="accent1">
+              <a:shade val="50000"/>
+            </a:schemeClr>
+          </a:lnRef>
+          <a:fillRef idx="1">
+            <a:schemeClr val="accent1"/>
+          </a:fillRef>
+          <a:effectRef idx="0">
+            <a:schemeClr val="accent1"/>
+          </a:effectRef>
+          <a:fontRef idx="minor">
+            <a:schemeClr val="lt1"/>
+          </a:fontRef>
+        </p:style>
+        <p:txBody>
+          <a:bodyPr rtlCol="0" anchor="ctr"/>
+          <a:lstStyle/>
+          <a:p>
+            <a:pPr algn="ctr"/>
+            <a:endParaRPr lang="en-US" dirty="0"/>
+          </a:p>
+        </p:txBody>
+      </p:sp>
+      <p:cxnSp>
+        <p:nvCxnSpPr>
+          <p:cNvPr id="30" name="Straight Arrow Connector 29">
+            <a:extLst>
+              <a:ext uri="{FF2B5EF4-FFF2-40B4-BE49-F238E27FC236}">
+                <a16:creationId xmlns:a16="http://schemas.microsoft.com/office/drawing/2014/main" id="{A9CF9882-C571-437E-AAF3-2563061338AD}"/>
+              </a:ext>
+            </a:extLst>
+          </p:cNvPr>
+          <p:cNvCxnSpPr/>
+          <p:nvPr/>
+        </p:nvCxnSpPr>
+        <p:spPr>
+          <a:xfrm>
+            <a:off x="4768929" y="2602001"/>
+            <a:ext cx="352425" cy="0"/>
+          </a:xfrm>
+          <a:prstGeom prst="straightConnector1">
+            <a:avLst/>
+          </a:prstGeom>
+          <a:ln w="12700">
+            <a:tailEnd type="triangle"/>
+          </a:ln>
+        </p:spPr>
+        <p:style>
+          <a:lnRef idx="1">
+            <a:schemeClr val="dk1"/>
+          </a:lnRef>
+          <a:fillRef idx="0">
+            <a:schemeClr val="dk1"/>
+          </a:fillRef>
+          <a:effectRef idx="0">
+            <a:schemeClr val="dk1"/>
+          </a:effectRef>
+          <a:fontRef idx="minor">
+            <a:schemeClr val="tx1"/>
+          </a:fontRef>
+        </p:style>
+      </p:cxnSp>
+      <p:graphicFrame>
+        <p:nvGraphicFramePr>
+          <p:cNvPr id="31" name="Content Placeholder 14">
+            <a:extLst>
+              <a:ext uri="{FF2B5EF4-FFF2-40B4-BE49-F238E27FC236}">
+                <a16:creationId xmlns:a16="http://schemas.microsoft.com/office/drawing/2014/main" id="{32181FA5-642D-46F9-B62C-F0BC46BC25D2}"/>
+              </a:ext>
+            </a:extLst>
+          </p:cNvPr>
+          <p:cNvGraphicFramePr>
+            <a:graphicFrameLocks/>
+          </p:cNvGraphicFramePr>
+          <p:nvPr>
+            <p:extLst>
+              <p:ext uri="{D42A27DB-BD31-4B8C-83A1-F6EECF244321}">
+                <p14:modId xmlns:p14="http://schemas.microsoft.com/office/powerpoint/2010/main" val="3141559715"/>
+              </p:ext>
+            </p:extLst>
+          </p:nvPr>
+        </p:nvGraphicFramePr>
+        <p:xfrm>
+          <a:off x="5121355" y="2487826"/>
+          <a:ext cx="1068878" cy="822960"/>
+        </p:xfrm>
+        <a:graphic>
+          <a:graphicData uri="http://schemas.openxmlformats.org/drawingml/2006/table">
+            <a:tbl>
+              <a:tblPr firstRow="1" bandRow="1">
+                <a:tableStyleId>{5940675A-B579-460E-94D1-54222C63F5DA}</a:tableStyleId>
+              </a:tblPr>
+              <a:tblGrid>
+                <a:gridCol w="534439">
+                  <a:extLst>
+                    <a:ext uri="{9D8B030D-6E8A-4147-A177-3AD203B41FA5}">
+                      <a16:colId xmlns:a16="http://schemas.microsoft.com/office/drawing/2014/main" val="2645091282"/>
+                    </a:ext>
+                  </a:extLst>
+                </a:gridCol>
+                <a:gridCol w="534439">
+                  <a:extLst>
+                    <a:ext uri="{9D8B030D-6E8A-4147-A177-3AD203B41FA5}">
+                      <a16:colId xmlns:a16="http://schemas.microsoft.com/office/drawing/2014/main" val="2668859156"/>
+                    </a:ext>
+                  </a:extLst>
+                </a:gridCol>
+              </a:tblGrid>
+              <a:tr h="186540">
+                <a:tc>
+                  <a:txBody>
+                    <a:bodyPr/>
+                    <a:lstStyle/>
+                    <a:p>
+                      <a:pPr algn="ctr"/>
+                      <a:r>
+                        <a:rPr lang="en-US" sz="1200" dirty="0"/>
+                        <a:t>s</a:t>
+                      </a:r>
+                      <a:r>
+                        <a:rPr lang="en-US" sz="1200" baseline="-25000" dirty="0"/>
+                        <a:t>2</a:t>
+                      </a:r>
+                      <a:endParaRPr lang="en-US" dirty="0"/>
+                    </a:p>
+                  </a:txBody>
+                  <a:tcPr/>
+                </a:tc>
+                <a:tc>
+                  <a:txBody>
+                    <a:bodyPr/>
+                    <a:lstStyle/>
+                    <a:p>
+                      <a:pPr algn="ctr"/>
+                      <a:r>
+                        <a:rPr lang="en-US" sz="1200" dirty="0"/>
+                        <a:t>8</a:t>
+                      </a:r>
+                    </a:p>
+                  </a:txBody>
+                  <a:tcPr/>
+                </a:tc>
+                <a:extLst>
+                  <a:ext uri="{0D108BD9-81ED-4DB2-BD59-A6C34878D82A}">
+                    <a16:rowId xmlns:a16="http://schemas.microsoft.com/office/drawing/2014/main" val="2052664713"/>
+                  </a:ext>
+                </a:extLst>
+              </a:tr>
+              <a:tr h="182880">
+                <a:tc>
+                  <a:txBody>
+                    <a:bodyPr/>
+                    <a:lstStyle/>
+                    <a:p>
+                      <a:pPr marL="0" marR="0" lvl="0" indent="0" algn="ctr" defTabSz="914400" rtl="0" eaLnBrk="1" fontAlgn="auto" latinLnBrk="0" hangingPunct="1">
+                        <a:lnSpc>
+                          <a:spcPct val="100000"/>
+                        </a:lnSpc>
+                        <a:spcBef>
+                          <a:spcPts val="0"/>
+                        </a:spcBef>
+                        <a:spcAft>
+                          <a:spcPts val="0"/>
+                        </a:spcAft>
+                        <a:buClrTx/>
+                        <a:buSzTx/>
+                        <a:buFontTx/>
+                        <a:buNone/>
+                        <a:tabLst/>
+                        <a:defRPr/>
+                      </a:pPr>
+                      <a:r>
+                        <a:rPr lang="en-US" sz="1200" dirty="0"/>
+                        <a:t>s</a:t>
+                      </a:r>
+                      <a:r>
+                        <a:rPr lang="en-US" sz="1200" baseline="-25000" dirty="0"/>
+                        <a:t>3</a:t>
+                      </a:r>
+                      <a:endParaRPr lang="en-US" dirty="0"/>
+                    </a:p>
+                  </a:txBody>
+                  <a:tcPr/>
+                </a:tc>
+                <a:tc>
+                  <a:txBody>
+                    <a:bodyPr/>
+                    <a:lstStyle/>
+                    <a:p>
+                      <a:pPr algn="ctr"/>
+                      <a:r>
+                        <a:rPr lang="en-US" sz="1200" dirty="0"/>
+                        <a:t>3</a:t>
+                      </a:r>
+                    </a:p>
+                  </a:txBody>
+                  <a:tcPr/>
+                </a:tc>
+                <a:extLst>
+                  <a:ext uri="{0D108BD9-81ED-4DB2-BD59-A6C34878D82A}">
+                    <a16:rowId xmlns:a16="http://schemas.microsoft.com/office/drawing/2014/main" val="2622467470"/>
+                  </a:ext>
+                </a:extLst>
+              </a:tr>
+              <a:tr h="182880">
+                <a:tc>
+                  <a:txBody>
+                    <a:bodyPr/>
+                    <a:lstStyle/>
+                    <a:p>
+                      <a:pPr marL="0" marR="0" lvl="0" indent="0" algn="ctr" defTabSz="914400" rtl="0" eaLnBrk="1" fontAlgn="auto" latinLnBrk="0" hangingPunct="1">
+                        <a:lnSpc>
+                          <a:spcPct val="100000"/>
+                        </a:lnSpc>
+                        <a:spcBef>
+                          <a:spcPts val="0"/>
+                        </a:spcBef>
+                        <a:spcAft>
+                          <a:spcPts val="0"/>
+                        </a:spcAft>
+                        <a:buClrTx/>
+                        <a:buSzTx/>
+                        <a:buFontTx/>
+                        <a:buNone/>
+                        <a:tabLst/>
+                        <a:defRPr/>
+                      </a:pPr>
+                      <a:r>
+                        <a:rPr lang="en-US" sz="1200" dirty="0"/>
+                        <a:t>s</a:t>
+                      </a:r>
+                      <a:r>
+                        <a:rPr lang="en-US" sz="1200" baseline="-25000" dirty="0"/>
+                        <a:t>1</a:t>
+                      </a:r>
+                      <a:endParaRPr lang="en-US" sz="1200" dirty="0"/>
+                    </a:p>
+                  </a:txBody>
+                  <a:tcPr/>
+                </a:tc>
+                <a:tc>
+                  <a:txBody>
+                    <a:bodyPr/>
+                    <a:lstStyle/>
+                    <a:p>
+                      <a:pPr algn="ctr"/>
+                      <a:r>
+                        <a:rPr lang="en-US" sz="1200" dirty="0"/>
+                        <a:t>1</a:t>
+                      </a:r>
+                    </a:p>
+                  </a:txBody>
+                  <a:tcPr/>
+                </a:tc>
+                <a:extLst>
+                  <a:ext uri="{0D108BD9-81ED-4DB2-BD59-A6C34878D82A}">
+                    <a16:rowId xmlns:a16="http://schemas.microsoft.com/office/drawing/2014/main" val="2452769273"/>
+                  </a:ext>
+                </a:extLst>
+              </a:tr>
+            </a:tbl>
+          </a:graphicData>
+        </a:graphic>
+      </p:graphicFrame>
+      <p:sp>
+        <p:nvSpPr>
+          <p:cNvPr id="51" name="Rectangle 50">
+            <a:extLst>
+              <a:ext uri="{FF2B5EF4-FFF2-40B4-BE49-F238E27FC236}">
+                <a16:creationId xmlns:a16="http://schemas.microsoft.com/office/drawing/2014/main" id="{DB42BA2E-FBBF-4BC8-BF18-365A883D2552}"/>
+              </a:ext>
+            </a:extLst>
+          </p:cNvPr>
+          <p:cNvSpPr/>
+          <p:nvPr/>
+        </p:nvSpPr>
+        <p:spPr>
+          <a:xfrm>
+            <a:off x="2051177" y="1162168"/>
+            <a:ext cx="1904873" cy="2441379"/>
+          </a:xfrm>
+          <a:prstGeom prst="rect">
+            <a:avLst/>
+          </a:prstGeom>
+          <a:noFill/>
+          <a:ln>
+            <a:solidFill>
+              <a:schemeClr val="tx1"/>
+            </a:solidFill>
+          </a:ln>
+        </p:spPr>
+        <p:style>
+          <a:lnRef idx="2">
+            <a:schemeClr val="accent1">
+              <a:shade val="50000"/>
+            </a:schemeClr>
+          </a:lnRef>
+          <a:fillRef idx="1">
+            <a:schemeClr val="accent1"/>
+          </a:fillRef>
+          <a:effectRef idx="0">
+            <a:schemeClr val="accent1"/>
+          </a:effectRef>
+          <a:fontRef idx="minor">
+            <a:schemeClr val="lt1"/>
+          </a:fontRef>
+        </p:style>
+        <p:txBody>
+          <a:bodyPr rtlCol="0" anchor="ctr"/>
+          <a:lstStyle/>
+          <a:p>
+            <a:pPr algn="ctr"/>
+            <a:endParaRPr lang="en-US"/>
+          </a:p>
+        </p:txBody>
+      </p:sp>
+      <p:grpSp>
+        <p:nvGrpSpPr>
+          <p:cNvPr id="52" name="Group 51">
+            <a:extLst>
+              <a:ext uri="{FF2B5EF4-FFF2-40B4-BE49-F238E27FC236}">
+                <a16:creationId xmlns:a16="http://schemas.microsoft.com/office/drawing/2014/main" id="{20B8D8BA-B5EE-408A-8D83-531823C89816}"/>
+              </a:ext>
+            </a:extLst>
+          </p:cNvPr>
+          <p:cNvGrpSpPr/>
+          <p:nvPr/>
+        </p:nvGrpSpPr>
+        <p:grpSpPr>
+          <a:xfrm>
+            <a:off x="2171227" y="1270959"/>
+            <a:ext cx="1704392" cy="822960"/>
+            <a:chOff x="7259267" y="2414120"/>
+            <a:chExt cx="1704392" cy="893727"/>
+          </a:xfrm>
+        </p:grpSpPr>
+        <p:grpSp>
+          <p:nvGrpSpPr>
+            <p:cNvPr id="59" name="Group 58">
+              <a:extLst>
+                <a:ext uri="{FF2B5EF4-FFF2-40B4-BE49-F238E27FC236}">
+                  <a16:creationId xmlns:a16="http://schemas.microsoft.com/office/drawing/2014/main" id="{4A0C523D-9DE8-4D1D-A387-1C9C1A0D48E4}"/>
+                </a:ext>
+              </a:extLst>
+            </p:cNvPr>
+            <p:cNvGrpSpPr/>
+            <p:nvPr/>
+          </p:nvGrpSpPr>
+          <p:grpSpPr>
+            <a:xfrm>
+              <a:off x="7259267" y="2425700"/>
+              <a:ext cx="284109" cy="246221"/>
+              <a:chOff x="4534126" y="1606550"/>
+              <a:chExt cx="284109" cy="246221"/>
+            </a:xfrm>
+          </p:grpSpPr>
+          <p:sp>
+            <p:nvSpPr>
+              <p:cNvPr id="62" name="TextBox 61">
+                <a:extLst>
+                  <a:ext uri="{FF2B5EF4-FFF2-40B4-BE49-F238E27FC236}">
+                    <a16:creationId xmlns:a16="http://schemas.microsoft.com/office/drawing/2014/main" id="{47747C35-7C0F-4690-A196-6C251E229729}"/>
+                  </a:ext>
+                </a:extLst>
+              </p:cNvPr>
+              <p:cNvSpPr txBox="1"/>
+              <p:nvPr/>
+            </p:nvSpPr>
+            <p:spPr>
+              <a:xfrm>
+                <a:off x="4534126" y="1606550"/>
+                <a:ext cx="284109" cy="246221"/>
+              </a:xfrm>
+              <a:prstGeom prst="rect">
+                <a:avLst/>
+              </a:prstGeom>
+              <a:noFill/>
+            </p:spPr>
+            <p:txBody>
+              <a:bodyPr wrap="square" rtlCol="0">
+                <a:spAutoFit/>
+              </a:bodyPr>
+              <a:lstStyle/>
+              <a:p>
+                <a:pPr algn="ctr"/>
+                <a:r>
+                  <a:rPr lang="en-US" sz="1000" dirty="0"/>
+                  <a:t>s</a:t>
+                </a:r>
+                <a:r>
+                  <a:rPr lang="en-US" sz="1000" baseline="-25000" dirty="0"/>
+                  <a:t>1</a:t>
+                </a:r>
+                <a:endParaRPr lang="en-US" sz="1000" dirty="0"/>
+              </a:p>
+            </p:txBody>
+          </p:sp>
+          <p:sp>
+            <p:nvSpPr>
+              <p:cNvPr id="63" name="Rectangle 62">
+                <a:extLst>
+                  <a:ext uri="{FF2B5EF4-FFF2-40B4-BE49-F238E27FC236}">
+                    <a16:creationId xmlns:a16="http://schemas.microsoft.com/office/drawing/2014/main" id="{A73C5259-B7AF-484A-8A0D-77117DA36092}"/>
+                  </a:ext>
+                </a:extLst>
+              </p:cNvPr>
+              <p:cNvSpPr/>
+              <p:nvPr/>
+            </p:nvSpPr>
+            <p:spPr>
+              <a:xfrm>
+                <a:off x="4534127" y="1619252"/>
+                <a:ext cx="266701" cy="230832"/>
+              </a:xfrm>
+              <a:prstGeom prst="rect">
+                <a:avLst/>
+              </a:prstGeom>
+              <a:noFill/>
+              <a:ln>
+                <a:solidFill>
+                  <a:schemeClr val="tx1"/>
+                </a:solidFill>
+              </a:ln>
+            </p:spPr>
+            <p:style>
+              <a:lnRef idx="2">
+                <a:schemeClr val="accent1">
+                  <a:shade val="50000"/>
+                </a:schemeClr>
+              </a:lnRef>
+              <a:fillRef idx="1">
+                <a:schemeClr val="accent1"/>
+              </a:fillRef>
+              <a:effectRef idx="0">
+                <a:schemeClr val="accent1"/>
+              </a:effectRef>
+              <a:fontRef idx="minor">
+                <a:schemeClr val="lt1"/>
+              </a:fontRef>
+            </p:style>
+            <p:txBody>
+              <a:bodyPr rtlCol="0" anchor="ctr"/>
+              <a:lstStyle/>
+              <a:p>
+                <a:pPr algn="ctr"/>
+                <a:endParaRPr lang="en-US" dirty="0"/>
+              </a:p>
+            </p:txBody>
+          </p:sp>
+        </p:grpSp>
+        <p:cxnSp>
+          <p:nvCxnSpPr>
+            <p:cNvPr id="60" name="Straight Arrow Connector 59">
+              <a:extLst>
+                <a:ext uri="{FF2B5EF4-FFF2-40B4-BE49-F238E27FC236}">
+                  <a16:creationId xmlns:a16="http://schemas.microsoft.com/office/drawing/2014/main" id="{76C2CBE1-86CC-45A5-9298-1E842CF68AF9}"/>
+                </a:ext>
+              </a:extLst>
+            </p:cNvPr>
+            <p:cNvCxnSpPr/>
+            <p:nvPr/>
+          </p:nvCxnSpPr>
+          <p:spPr>
+            <a:xfrm>
+              <a:off x="7525969" y="2537943"/>
+              <a:ext cx="352425" cy="0"/>
+            </a:xfrm>
+            <a:prstGeom prst="straightConnector1">
+              <a:avLst/>
+            </a:prstGeom>
+            <a:ln w="12700">
+              <a:tailEnd type="triangle"/>
+            </a:ln>
+          </p:spPr>
+          <p:style>
+            <a:lnRef idx="1">
+              <a:schemeClr val="dk1"/>
+            </a:lnRef>
+            <a:fillRef idx="0">
+              <a:schemeClr val="dk1"/>
+            </a:fillRef>
+            <a:effectRef idx="0">
+              <a:schemeClr val="dk1"/>
+            </a:effectRef>
+            <a:fontRef idx="minor">
+              <a:schemeClr val="tx1"/>
+            </a:fontRef>
+          </p:style>
+        </p:cxnSp>
+        <p:graphicFrame>
+          <p:nvGraphicFramePr>
+            <p:cNvPr id="61" name="Content Placeholder 14">
+              <a:extLst>
+                <a:ext uri="{FF2B5EF4-FFF2-40B4-BE49-F238E27FC236}">
+                  <a16:creationId xmlns:a16="http://schemas.microsoft.com/office/drawing/2014/main" id="{4F8037FE-B800-4CC8-AEC2-9C152A2A20A0}"/>
+                </a:ext>
+              </a:extLst>
+            </p:cNvPr>
+            <p:cNvGraphicFramePr>
+              <a:graphicFrameLocks/>
+            </p:cNvGraphicFramePr>
+            <p:nvPr>
+              <p:extLst>
+                <p:ext uri="{D42A27DB-BD31-4B8C-83A1-F6EECF244321}">
+                  <p14:modId xmlns:p14="http://schemas.microsoft.com/office/powerpoint/2010/main" val="476710379"/>
+                </p:ext>
+              </p:extLst>
+            </p:nvPr>
+          </p:nvGraphicFramePr>
+          <p:xfrm>
+            <a:off x="7878391" y="2414120"/>
+            <a:ext cx="1085268" cy="893727"/>
+          </p:xfrm>
+          <a:graphic>
+            <a:graphicData uri="http://schemas.openxmlformats.org/drawingml/2006/table">
+              <a:tbl>
+                <a:tblPr firstRow="1" bandRow="1">
+                  <a:tableStyleId>{5940675A-B579-460E-94D1-54222C63F5DA}</a:tableStyleId>
+                </a:tblPr>
+                <a:tblGrid>
+                  <a:gridCol w="542634">
+                    <a:extLst>
+                      <a:ext uri="{9D8B030D-6E8A-4147-A177-3AD203B41FA5}">
+                        <a16:colId xmlns:a16="http://schemas.microsoft.com/office/drawing/2014/main" val="2645091282"/>
+                      </a:ext>
+                    </a:extLst>
+                  </a:gridCol>
+                  <a:gridCol w="542634">
+                    <a:extLst>
+                      <a:ext uri="{9D8B030D-6E8A-4147-A177-3AD203B41FA5}">
+                        <a16:colId xmlns:a16="http://schemas.microsoft.com/office/drawing/2014/main" val="2668859156"/>
+                      </a:ext>
+                    </a:extLst>
+                  </a:gridCol>
+                </a:tblGrid>
+                <a:tr h="186540">
+                  <a:tc>
+                    <a:txBody>
+                      <a:bodyPr/>
+                      <a:lstStyle/>
+                      <a:p>
+                        <a:pPr algn="ctr"/>
+                        <a:r>
+                          <a:rPr lang="en-US" sz="1200" dirty="0"/>
+                          <a:t>s</a:t>
+                        </a:r>
+                        <a:r>
+                          <a:rPr lang="en-US" sz="1200" baseline="-25000" dirty="0"/>
+                          <a:t>3</a:t>
+                        </a:r>
+                        <a:endParaRPr lang="en-US" dirty="0"/>
+                      </a:p>
+                    </a:txBody>
+                    <a:tcPr/>
+                  </a:tc>
+                  <a:tc>
+                    <a:txBody>
+                      <a:bodyPr/>
+                      <a:lstStyle/>
+                      <a:p>
+                        <a:pPr algn="ctr"/>
+                        <a:r>
+                          <a:rPr lang="en-US" sz="1200" dirty="0"/>
+                          <a:t>7</a:t>
+                        </a:r>
+                      </a:p>
+                    </a:txBody>
+                    <a:tcPr/>
+                  </a:tc>
+                  <a:extLst>
+                    <a:ext uri="{0D108BD9-81ED-4DB2-BD59-A6C34878D82A}">
+                      <a16:rowId xmlns:a16="http://schemas.microsoft.com/office/drawing/2014/main" val="2052664713"/>
+                    </a:ext>
+                  </a:extLst>
+                </a:tr>
+                <a:tr h="274320">
+                  <a:tc>
+                    <a:txBody>
+                      <a:bodyPr/>
+                      <a:lstStyle/>
+                      <a:p>
+                        <a:pPr marL="0" marR="0" lvl="0" indent="0" algn="ctr" defTabSz="914400" rtl="0" eaLnBrk="1" fontAlgn="auto" latinLnBrk="0" hangingPunct="1">
+                          <a:lnSpc>
+                            <a:spcPct val="100000"/>
+                          </a:lnSpc>
+                          <a:spcBef>
+                            <a:spcPts val="0"/>
+                          </a:spcBef>
+                          <a:spcAft>
+                            <a:spcPts val="0"/>
+                          </a:spcAft>
+                          <a:buClrTx/>
+                          <a:buSzTx/>
+                          <a:buFontTx/>
+                          <a:buNone/>
+                          <a:tabLst/>
+                          <a:defRPr/>
+                        </a:pPr>
+                        <a:r>
+                          <a:rPr lang="en-US" sz="1200" dirty="0"/>
+                          <a:t>s</a:t>
+                        </a:r>
+                        <a:r>
+                          <a:rPr lang="en-US" sz="1200" baseline="-25000" dirty="0"/>
+                          <a:t>2</a:t>
+                        </a:r>
+                        <a:endParaRPr lang="en-US" dirty="0"/>
+                      </a:p>
+                    </a:txBody>
+                    <a:tcPr/>
+                  </a:tc>
+                  <a:tc>
+                    <a:txBody>
+                      <a:bodyPr/>
+                      <a:lstStyle/>
+                      <a:p>
+                        <a:pPr algn="ctr"/>
+                        <a:r>
+                          <a:rPr lang="en-US" sz="1200" dirty="0"/>
+                          <a:t>1</a:t>
+                        </a:r>
+                      </a:p>
+                    </a:txBody>
+                    <a:tcPr/>
+                  </a:tc>
+                  <a:extLst>
+                    <a:ext uri="{0D108BD9-81ED-4DB2-BD59-A6C34878D82A}">
+                      <a16:rowId xmlns:a16="http://schemas.microsoft.com/office/drawing/2014/main" val="875302221"/>
+                    </a:ext>
+                  </a:extLst>
+                </a:tr>
+                <a:tr h="182880">
+                  <a:tc>
+                    <a:txBody>
+                      <a:bodyPr/>
+                      <a:lstStyle/>
+                      <a:p>
+                        <a:pPr marL="0" marR="0" lvl="0" indent="0" algn="ctr" defTabSz="914400" rtl="0" eaLnBrk="1" fontAlgn="auto" latinLnBrk="0" hangingPunct="1">
+                          <a:lnSpc>
+                            <a:spcPct val="100000"/>
+                          </a:lnSpc>
+                          <a:spcBef>
+                            <a:spcPts val="0"/>
+                          </a:spcBef>
+                          <a:spcAft>
+                            <a:spcPts val="0"/>
+                          </a:spcAft>
+                          <a:buClrTx/>
+                          <a:buSzTx/>
+                          <a:buFontTx/>
+                          <a:buNone/>
+                          <a:tabLst/>
+                          <a:defRPr/>
+                        </a:pPr>
+                        <a:r>
+                          <a:rPr lang="en-US" sz="1200" dirty="0">
+                            <a:solidFill>
+                              <a:srgbClr val="FF0000"/>
+                            </a:solidFill>
+                          </a:rPr>
+                          <a:t>s</a:t>
+                        </a:r>
+                        <a:r>
+                          <a:rPr lang="en-US" sz="1200" baseline="-25000" dirty="0">
+                            <a:solidFill>
+                              <a:srgbClr val="FF0000"/>
+                            </a:solidFill>
+                          </a:rPr>
+                          <a:t>4 </a:t>
+                        </a:r>
+                        <a:r>
+                          <a:rPr lang="en-US" sz="1200" dirty="0">
+                            <a:solidFill>
+                              <a:srgbClr val="FF0000"/>
+                            </a:solidFill>
+                          </a:rPr>
+                          <a:t>+ s</a:t>
+                        </a:r>
+                        <a:r>
+                          <a:rPr lang="en-US" sz="1200" baseline="-25000" dirty="0">
+                            <a:solidFill>
+                              <a:srgbClr val="FF0000"/>
+                            </a:solidFill>
+                          </a:rPr>
+                          <a:t>5</a:t>
+                        </a:r>
+                        <a:endParaRPr lang="en-US" sz="1200" dirty="0">
+                          <a:solidFill>
+                            <a:srgbClr val="FF0000"/>
+                          </a:solidFill>
+                        </a:endParaRPr>
+                      </a:p>
+                    </a:txBody>
+                    <a:tcPr/>
+                  </a:tc>
+                  <a:tc>
+                    <a:txBody>
+                      <a:bodyPr/>
+                      <a:lstStyle/>
+                      <a:p>
+                        <a:pPr algn="ctr"/>
+                        <a:r>
+                          <a:rPr lang="en-US" sz="1200" dirty="0"/>
+                          <a:t>0</a:t>
+                        </a:r>
+                      </a:p>
+                    </a:txBody>
+                    <a:tcPr/>
+                  </a:tc>
+                  <a:extLst>
+                    <a:ext uri="{0D108BD9-81ED-4DB2-BD59-A6C34878D82A}">
+                      <a16:rowId xmlns:a16="http://schemas.microsoft.com/office/drawing/2014/main" val="2452769273"/>
+                    </a:ext>
+                  </a:extLst>
+                </a:tr>
+              </a:tbl>
+            </a:graphicData>
+          </a:graphic>
+        </p:graphicFrame>
+      </p:grpSp>
+      <p:sp>
+        <p:nvSpPr>
+          <p:cNvPr id="65" name="Rectangle 64">
+            <a:extLst>
+              <a:ext uri="{FF2B5EF4-FFF2-40B4-BE49-F238E27FC236}">
+                <a16:creationId xmlns:a16="http://schemas.microsoft.com/office/drawing/2014/main" id="{7EFB8CF4-5CA5-43F7-A39D-331450D8C19B}"/>
+              </a:ext>
+            </a:extLst>
+          </p:cNvPr>
+          <p:cNvSpPr/>
+          <p:nvPr/>
+        </p:nvSpPr>
+        <p:spPr>
+          <a:xfrm>
+            <a:off x="6643497" y="1162168"/>
+            <a:ext cx="1904873" cy="2441379"/>
+          </a:xfrm>
+          <a:prstGeom prst="rect">
+            <a:avLst/>
+          </a:prstGeom>
+          <a:noFill/>
+          <a:ln>
+            <a:solidFill>
+              <a:schemeClr val="tx1"/>
+            </a:solidFill>
+          </a:ln>
+        </p:spPr>
+        <p:style>
+          <a:lnRef idx="2">
+            <a:schemeClr val="accent1">
+              <a:shade val="50000"/>
+            </a:schemeClr>
+          </a:lnRef>
+          <a:fillRef idx="1">
+            <a:schemeClr val="accent1"/>
+          </a:fillRef>
+          <a:effectRef idx="0">
+            <a:schemeClr val="accent1"/>
+          </a:effectRef>
+          <a:fontRef idx="minor">
+            <a:schemeClr val="lt1"/>
+          </a:fontRef>
+        </p:style>
+        <p:txBody>
+          <a:bodyPr rtlCol="0" anchor="ctr"/>
+          <a:lstStyle/>
+          <a:p>
+            <a:pPr algn="ctr"/>
+            <a:endParaRPr lang="en-US"/>
+          </a:p>
+        </p:txBody>
+      </p:sp>
+      <p:grpSp>
+        <p:nvGrpSpPr>
+          <p:cNvPr id="66" name="Group 65">
+            <a:extLst>
+              <a:ext uri="{FF2B5EF4-FFF2-40B4-BE49-F238E27FC236}">
+                <a16:creationId xmlns:a16="http://schemas.microsoft.com/office/drawing/2014/main" id="{4194327A-7414-4EAA-B30B-BFBCEDDEA376}"/>
+              </a:ext>
+            </a:extLst>
+          </p:cNvPr>
+          <p:cNvGrpSpPr/>
+          <p:nvPr/>
+        </p:nvGrpSpPr>
+        <p:grpSpPr>
+          <a:xfrm>
+            <a:off x="6772013" y="1275719"/>
+            <a:ext cx="1704392" cy="847193"/>
+            <a:chOff x="7259267" y="2414122"/>
+            <a:chExt cx="1704392" cy="847193"/>
+          </a:xfrm>
+        </p:grpSpPr>
+        <p:grpSp>
+          <p:nvGrpSpPr>
+            <p:cNvPr id="73" name="Group 72">
+              <a:extLst>
+                <a:ext uri="{FF2B5EF4-FFF2-40B4-BE49-F238E27FC236}">
+                  <a16:creationId xmlns:a16="http://schemas.microsoft.com/office/drawing/2014/main" id="{227D5DF8-CD4F-4EF5-B9FE-CDFD704E6E9E}"/>
+                </a:ext>
+              </a:extLst>
+            </p:cNvPr>
+            <p:cNvGrpSpPr/>
+            <p:nvPr/>
+          </p:nvGrpSpPr>
+          <p:grpSpPr>
+            <a:xfrm>
+              <a:off x="7259267" y="2425700"/>
+              <a:ext cx="284109" cy="246221"/>
+              <a:chOff x="4534126" y="1606550"/>
+              <a:chExt cx="284109" cy="246221"/>
+            </a:xfrm>
+          </p:grpSpPr>
+          <p:sp>
+            <p:nvSpPr>
+              <p:cNvPr id="76" name="TextBox 75">
+                <a:extLst>
+                  <a:ext uri="{FF2B5EF4-FFF2-40B4-BE49-F238E27FC236}">
+                    <a16:creationId xmlns:a16="http://schemas.microsoft.com/office/drawing/2014/main" id="{DFDF440C-4FEA-4B7A-9F30-7A43FAC9839E}"/>
+                  </a:ext>
+                </a:extLst>
+              </p:cNvPr>
+              <p:cNvSpPr txBox="1"/>
+              <p:nvPr/>
+            </p:nvSpPr>
+            <p:spPr>
+              <a:xfrm>
+                <a:off x="4534126" y="1606550"/>
+                <a:ext cx="284109" cy="246221"/>
+              </a:xfrm>
+              <a:prstGeom prst="rect">
+                <a:avLst/>
+              </a:prstGeom>
+              <a:noFill/>
+            </p:spPr>
+            <p:txBody>
+              <a:bodyPr wrap="square" rtlCol="0">
+                <a:spAutoFit/>
+              </a:bodyPr>
+              <a:lstStyle/>
+              <a:p>
+                <a:pPr algn="ctr"/>
+                <a:r>
+                  <a:rPr lang="en-US" sz="1000" dirty="0"/>
+                  <a:t>s</a:t>
+                </a:r>
+                <a:r>
+                  <a:rPr lang="en-US" sz="1000" baseline="-25000" dirty="0"/>
+                  <a:t>3</a:t>
+                </a:r>
+                <a:endParaRPr lang="en-US" sz="1000" dirty="0"/>
+              </a:p>
+            </p:txBody>
+          </p:sp>
+          <p:sp>
+            <p:nvSpPr>
+              <p:cNvPr id="77" name="Rectangle 76">
+                <a:extLst>
+                  <a:ext uri="{FF2B5EF4-FFF2-40B4-BE49-F238E27FC236}">
+                    <a16:creationId xmlns:a16="http://schemas.microsoft.com/office/drawing/2014/main" id="{04BB6BAC-3270-4B25-ACF3-B5C6F08D4042}"/>
+                  </a:ext>
+                </a:extLst>
+              </p:cNvPr>
+              <p:cNvSpPr/>
+              <p:nvPr/>
+            </p:nvSpPr>
+            <p:spPr>
+              <a:xfrm>
+                <a:off x="4534127" y="1619252"/>
+                <a:ext cx="266701" cy="230832"/>
+              </a:xfrm>
+              <a:prstGeom prst="rect">
+                <a:avLst/>
+              </a:prstGeom>
+              <a:noFill/>
+              <a:ln>
+                <a:solidFill>
+                  <a:schemeClr val="tx1"/>
+                </a:solidFill>
+              </a:ln>
+            </p:spPr>
+            <p:style>
+              <a:lnRef idx="2">
+                <a:schemeClr val="accent1">
+                  <a:shade val="50000"/>
+                </a:schemeClr>
+              </a:lnRef>
+              <a:fillRef idx="1">
+                <a:schemeClr val="accent1"/>
+              </a:fillRef>
+              <a:effectRef idx="0">
+                <a:schemeClr val="accent1"/>
+              </a:effectRef>
+              <a:fontRef idx="minor">
+                <a:schemeClr val="lt1"/>
+              </a:fontRef>
+            </p:style>
+            <p:txBody>
+              <a:bodyPr rtlCol="0" anchor="ctr"/>
+              <a:lstStyle/>
+              <a:p>
+                <a:pPr algn="ctr"/>
+                <a:endParaRPr lang="en-US" dirty="0"/>
+              </a:p>
+            </p:txBody>
+          </p:sp>
+        </p:grpSp>
+        <p:cxnSp>
+          <p:nvCxnSpPr>
+            <p:cNvPr id="74" name="Straight Arrow Connector 73">
+              <a:extLst>
+                <a:ext uri="{FF2B5EF4-FFF2-40B4-BE49-F238E27FC236}">
+                  <a16:creationId xmlns:a16="http://schemas.microsoft.com/office/drawing/2014/main" id="{2522460C-5B94-4C10-B616-0A81DF81751D}"/>
+                </a:ext>
+              </a:extLst>
+            </p:cNvPr>
+            <p:cNvCxnSpPr/>
+            <p:nvPr/>
+          </p:nvCxnSpPr>
+          <p:spPr>
+            <a:xfrm>
+              <a:off x="7525969" y="2537943"/>
+              <a:ext cx="352425" cy="0"/>
+            </a:xfrm>
+            <a:prstGeom prst="straightConnector1">
+              <a:avLst/>
+            </a:prstGeom>
+            <a:ln w="12700">
+              <a:tailEnd type="triangle"/>
+            </a:ln>
+          </p:spPr>
+          <p:style>
+            <a:lnRef idx="1">
+              <a:schemeClr val="dk1"/>
+            </a:lnRef>
+            <a:fillRef idx="0">
+              <a:schemeClr val="dk1"/>
+            </a:fillRef>
+            <a:effectRef idx="0">
+              <a:schemeClr val="dk1"/>
+            </a:effectRef>
+            <a:fontRef idx="minor">
+              <a:schemeClr val="tx1"/>
+            </a:fontRef>
+          </p:style>
+        </p:cxnSp>
+        <p:graphicFrame>
+          <p:nvGraphicFramePr>
+            <p:cNvPr id="75" name="Content Placeholder 14">
+              <a:extLst>
+                <a:ext uri="{FF2B5EF4-FFF2-40B4-BE49-F238E27FC236}">
+                  <a16:creationId xmlns:a16="http://schemas.microsoft.com/office/drawing/2014/main" id="{074782FF-724F-419B-9E25-1AED6D6295E4}"/>
+                </a:ext>
+              </a:extLst>
+            </p:cNvPr>
+            <p:cNvGraphicFramePr>
+              <a:graphicFrameLocks/>
+            </p:cNvGraphicFramePr>
+            <p:nvPr>
+              <p:extLst>
+                <p:ext uri="{D42A27DB-BD31-4B8C-83A1-F6EECF244321}">
+                  <p14:modId xmlns:p14="http://schemas.microsoft.com/office/powerpoint/2010/main" val="1949538839"/>
+                </p:ext>
+              </p:extLst>
+            </p:nvPr>
+          </p:nvGraphicFramePr>
+          <p:xfrm>
+            <a:off x="7878391" y="2414122"/>
+            <a:ext cx="1085268" cy="847193"/>
+          </p:xfrm>
+          <a:graphic>
+            <a:graphicData uri="http://schemas.openxmlformats.org/drawingml/2006/table">
+              <a:tbl>
+                <a:tblPr firstRow="1" bandRow="1">
+                  <a:tableStyleId>{5940675A-B579-460E-94D1-54222C63F5DA}</a:tableStyleId>
+                </a:tblPr>
+                <a:tblGrid>
+                  <a:gridCol w="542634">
+                    <a:extLst>
+                      <a:ext uri="{9D8B030D-6E8A-4147-A177-3AD203B41FA5}">
+                        <a16:colId xmlns:a16="http://schemas.microsoft.com/office/drawing/2014/main" val="2645091282"/>
+                      </a:ext>
+                    </a:extLst>
+                  </a:gridCol>
+                  <a:gridCol w="542634">
+                    <a:extLst>
+                      <a:ext uri="{9D8B030D-6E8A-4147-A177-3AD203B41FA5}">
+                        <a16:colId xmlns:a16="http://schemas.microsoft.com/office/drawing/2014/main" val="2668859156"/>
+                      </a:ext>
+                    </a:extLst>
+                  </a:gridCol>
+                </a:tblGrid>
+                <a:tr h="240065">
+                  <a:tc>
+                    <a:txBody>
+                      <a:bodyPr/>
+                      <a:lstStyle/>
+                      <a:p>
+                        <a:pPr algn="ctr"/>
+                        <a:r>
+                          <a:rPr lang="en-US" sz="1200" dirty="0"/>
+                          <a:t>s</a:t>
+                        </a:r>
+                        <a:r>
+                          <a:rPr lang="en-US" sz="1200" baseline="-25000" dirty="0"/>
+                          <a:t>1</a:t>
+                        </a:r>
+                        <a:endParaRPr lang="en-US" dirty="0"/>
+                      </a:p>
+                    </a:txBody>
+                    <a:tcPr/>
+                  </a:tc>
+                  <a:tc>
+                    <a:txBody>
+                      <a:bodyPr/>
+                      <a:lstStyle/>
+                      <a:p>
+                        <a:pPr algn="ctr"/>
+                        <a:r>
+                          <a:rPr lang="en-US" sz="1200" dirty="0"/>
+                          <a:t>4</a:t>
+                        </a:r>
+                      </a:p>
+                    </a:txBody>
+                    <a:tcPr/>
+                  </a:tc>
+                  <a:extLst>
+                    <a:ext uri="{0D108BD9-81ED-4DB2-BD59-A6C34878D82A}">
+                      <a16:rowId xmlns:a16="http://schemas.microsoft.com/office/drawing/2014/main" val="2052664713"/>
+                    </a:ext>
+                  </a:extLst>
+                </a:tr>
+                <a:tr h="240065">
+                  <a:tc>
+                    <a:txBody>
+                      <a:bodyPr/>
+                      <a:lstStyle/>
+                      <a:p>
+                        <a:pPr marL="0" marR="0" lvl="0" indent="0" algn="ctr" defTabSz="914400" rtl="0" eaLnBrk="1" fontAlgn="auto" latinLnBrk="0" hangingPunct="1">
+                          <a:lnSpc>
+                            <a:spcPct val="100000"/>
+                          </a:lnSpc>
+                          <a:spcBef>
+                            <a:spcPts val="0"/>
+                          </a:spcBef>
+                          <a:spcAft>
+                            <a:spcPts val="0"/>
+                          </a:spcAft>
+                          <a:buClrTx/>
+                          <a:buSzTx/>
+                          <a:buFontTx/>
+                          <a:buNone/>
+                          <a:tabLst/>
+                          <a:defRPr/>
+                        </a:pPr>
+                        <a:r>
+                          <a:rPr lang="en-US" sz="1200" dirty="0"/>
+                          <a:t>s</a:t>
+                        </a:r>
+                        <a:r>
+                          <a:rPr lang="en-US" sz="1200" baseline="-25000" dirty="0"/>
+                          <a:t>2</a:t>
+                        </a:r>
+                        <a:endParaRPr lang="en-US" dirty="0"/>
+                      </a:p>
+                    </a:txBody>
+                    <a:tcPr/>
+                  </a:tc>
+                  <a:tc>
+                    <a:txBody>
+                      <a:bodyPr/>
+                      <a:lstStyle/>
+                      <a:p>
+                        <a:pPr algn="ctr"/>
+                        <a:r>
+                          <a:rPr lang="en-US" sz="1200" dirty="0"/>
+                          <a:t>3</a:t>
+                        </a:r>
+                      </a:p>
+                    </a:txBody>
+                    <a:tcPr/>
+                  </a:tc>
+                  <a:extLst>
+                    <a:ext uri="{0D108BD9-81ED-4DB2-BD59-A6C34878D82A}">
+                      <a16:rowId xmlns:a16="http://schemas.microsoft.com/office/drawing/2014/main" val="2622467470"/>
+                    </a:ext>
+                  </a:extLst>
+                </a:tr>
+                <a:tr h="298553">
+                  <a:tc>
+                    <a:txBody>
+                      <a:bodyPr/>
+                      <a:lstStyle/>
+                      <a:p>
+                        <a:pPr marL="0" marR="0" lvl="0" indent="0" algn="ctr" defTabSz="914400" rtl="0" eaLnBrk="1" fontAlgn="auto" latinLnBrk="0" hangingPunct="1">
+                          <a:lnSpc>
+                            <a:spcPct val="100000"/>
+                          </a:lnSpc>
+                          <a:spcBef>
+                            <a:spcPts val="0"/>
+                          </a:spcBef>
+                          <a:spcAft>
+                            <a:spcPts val="0"/>
+                          </a:spcAft>
+                          <a:buClrTx/>
+                          <a:buSzTx/>
+                          <a:buFontTx/>
+                          <a:buNone/>
+                          <a:tabLst/>
+                          <a:defRPr/>
+                        </a:pPr>
+                        <a:r>
+                          <a:rPr lang="en-US" sz="1200" dirty="0">
+                            <a:solidFill>
+                              <a:srgbClr val="FF0000"/>
+                            </a:solidFill>
+                          </a:rPr>
+                          <a:t>s</a:t>
+                        </a:r>
+                        <a:r>
+                          <a:rPr lang="en-US" sz="1200" baseline="-25000" dirty="0">
+                            <a:solidFill>
+                              <a:srgbClr val="FF0000"/>
+                            </a:solidFill>
+                          </a:rPr>
+                          <a:t>4 </a:t>
+                        </a:r>
+                        <a:r>
+                          <a:rPr lang="en-US" sz="1200" dirty="0">
+                            <a:solidFill>
+                              <a:srgbClr val="FF0000"/>
+                            </a:solidFill>
+                          </a:rPr>
+                          <a:t>+ s</a:t>
+                        </a:r>
+                        <a:r>
+                          <a:rPr lang="en-US" sz="1200" baseline="-25000" dirty="0">
+                            <a:solidFill>
+                              <a:srgbClr val="FF0000"/>
+                            </a:solidFill>
+                          </a:rPr>
+                          <a:t>5</a:t>
+                        </a:r>
+                        <a:endParaRPr lang="en-US" sz="1200" dirty="0">
+                          <a:solidFill>
+                            <a:srgbClr val="FF0000"/>
+                          </a:solidFill>
+                        </a:endParaRPr>
+                      </a:p>
+                    </a:txBody>
+                    <a:tcPr/>
+                  </a:tc>
+                  <a:tc>
+                    <a:txBody>
+                      <a:bodyPr/>
+                      <a:lstStyle/>
+                      <a:p>
+                        <a:pPr algn="ctr"/>
+                        <a:r>
+                          <a:rPr lang="en-US" sz="1200" dirty="0"/>
+                          <a:t>1</a:t>
+                        </a:r>
+                      </a:p>
+                    </a:txBody>
+                    <a:tcPr/>
+                  </a:tc>
+                  <a:extLst>
+                    <a:ext uri="{0D108BD9-81ED-4DB2-BD59-A6C34878D82A}">
+                      <a16:rowId xmlns:a16="http://schemas.microsoft.com/office/drawing/2014/main" val="2452769273"/>
+                    </a:ext>
+                  </a:extLst>
+                </a:tr>
+              </a:tbl>
+            </a:graphicData>
+          </a:graphic>
+        </p:graphicFrame>
+      </p:grpSp>
+      <p:sp>
+        <p:nvSpPr>
+          <p:cNvPr id="78" name="TextBox 77">
+            <a:extLst>
+              <a:ext uri="{FF2B5EF4-FFF2-40B4-BE49-F238E27FC236}">
+                <a16:creationId xmlns:a16="http://schemas.microsoft.com/office/drawing/2014/main" id="{DFDF1305-3B67-44B9-80D9-36B3124672E3}"/>
+              </a:ext>
+            </a:extLst>
+          </p:cNvPr>
+          <p:cNvSpPr txBox="1"/>
+          <p:nvPr/>
+        </p:nvSpPr>
+        <p:spPr>
+          <a:xfrm>
+            <a:off x="2051176" y="876074"/>
+            <a:ext cx="1904873" cy="307777"/>
+          </a:xfrm>
+          <a:prstGeom prst="rect">
+            <a:avLst/>
+          </a:prstGeom>
+          <a:noFill/>
+        </p:spPr>
+        <p:txBody>
+          <a:bodyPr wrap="square" rtlCol="0">
+            <a:spAutoFit/>
+          </a:bodyPr>
+          <a:lstStyle/>
+          <a:p>
+            <a:pPr algn="ctr"/>
+            <a:r>
+              <a:rPr lang="en-US" sz="1400" dirty="0"/>
+              <a:t>Process 1</a:t>
+            </a:r>
+          </a:p>
+        </p:txBody>
+      </p:sp>
+      <p:sp>
+        <p:nvSpPr>
+          <p:cNvPr id="80" name="TextBox 79">
+            <a:extLst>
+              <a:ext uri="{FF2B5EF4-FFF2-40B4-BE49-F238E27FC236}">
+                <a16:creationId xmlns:a16="http://schemas.microsoft.com/office/drawing/2014/main" id="{40F1102A-FE0D-41D5-8FD3-BB754430738F}"/>
+              </a:ext>
+            </a:extLst>
+          </p:cNvPr>
+          <p:cNvSpPr txBox="1"/>
+          <p:nvPr/>
+        </p:nvSpPr>
+        <p:spPr>
+          <a:xfrm>
+            <a:off x="4347337" y="871277"/>
+            <a:ext cx="1904873" cy="307777"/>
+          </a:xfrm>
+          <a:prstGeom prst="rect">
+            <a:avLst/>
+          </a:prstGeom>
+          <a:noFill/>
+        </p:spPr>
+        <p:txBody>
+          <a:bodyPr wrap="square" rtlCol="0">
+            <a:spAutoFit/>
+          </a:bodyPr>
+          <a:lstStyle/>
+          <a:p>
+            <a:pPr algn="ctr"/>
+            <a:r>
+              <a:rPr lang="en-US" sz="1400" dirty="0"/>
+              <a:t>Process 2</a:t>
+            </a:r>
+          </a:p>
+        </p:txBody>
+      </p:sp>
+      <p:sp>
+        <p:nvSpPr>
+          <p:cNvPr id="81" name="TextBox 80">
+            <a:extLst>
+              <a:ext uri="{FF2B5EF4-FFF2-40B4-BE49-F238E27FC236}">
+                <a16:creationId xmlns:a16="http://schemas.microsoft.com/office/drawing/2014/main" id="{88BA2653-6AD6-4F1B-9722-577D0FADD9B1}"/>
+              </a:ext>
+            </a:extLst>
+          </p:cNvPr>
+          <p:cNvSpPr txBox="1"/>
+          <p:nvPr/>
+        </p:nvSpPr>
+        <p:spPr>
+          <a:xfrm>
+            <a:off x="6643496" y="888104"/>
+            <a:ext cx="1904873" cy="307777"/>
+          </a:xfrm>
+          <a:prstGeom prst="rect">
+            <a:avLst/>
+          </a:prstGeom>
+          <a:noFill/>
+        </p:spPr>
+        <p:txBody>
+          <a:bodyPr wrap="square" rtlCol="0">
+            <a:spAutoFit/>
+          </a:bodyPr>
+          <a:lstStyle/>
+          <a:p>
+            <a:pPr algn="ctr"/>
+            <a:r>
+              <a:rPr lang="en-US" sz="1400" dirty="0"/>
+              <a:t>Process 3</a:t>
+            </a:r>
+          </a:p>
+        </p:txBody>
+      </p:sp>
+    </p:spTree>
+    <p:extLst>
+      <p:ext uri="{BB962C8B-B14F-4D97-AF65-F5344CB8AC3E}">
+        <p14:creationId xmlns:p14="http://schemas.microsoft.com/office/powerpoint/2010/main" val="3513954128"/>
+      </p:ext>
+    </p:extLst>
+  </p:cSld>
+  <p:clrMapOvr>
+    <a:masterClrMapping/>
+  </p:clrMapOvr>
+</p:sld>
+</file>
+
+<file path=ppt/slides/slide4.xml><?xml version="1.0" encoding="utf-8"?>
 <p:sld xmlns:a="http://schemas.openxmlformats.org/drawingml/2006/main" xmlns:r="http://schemas.openxmlformats.org/officeDocument/2006/relationships" xmlns:p="http://schemas.openxmlformats.org/presentationml/2006/main">
   <p:cSld>
     <p:spTree>
@@ -6597,7 +8500,7 @@
             <a:pPr algn="ctr"/>
             <a:r>
               <a:rPr lang="en-US" sz="1400" dirty="0"/>
-              <a:t>Processor 1</a:t>
+              <a:t>Process 1</a:t>
             </a:r>
           </a:p>
         </p:txBody>
@@ -6633,7 +8536,7 @@
             <a:pPr algn="ctr"/>
             <a:r>
               <a:rPr lang="en-US" sz="1400" dirty="0"/>
-              <a:t>Processor 2</a:t>
+              <a:t>Process 2</a:t>
             </a:r>
           </a:p>
         </p:txBody>
@@ -6669,7 +8572,7 @@
             <a:pPr algn="ctr"/>
             <a:r>
               <a:rPr lang="en-US" sz="1400" dirty="0"/>
-              <a:t>Processor 3</a:t>
+              <a:t>Process 3</a:t>
             </a:r>
           </a:p>
         </p:txBody>
@@ -6947,7 +8850,7 @@
             <a:pPr algn="ctr"/>
             <a:r>
               <a:rPr lang="en-US" sz="1400" dirty="0"/>
-              <a:t>Processor 1</a:t>
+              <a:t>Process 1</a:t>
             </a:r>
           </a:p>
         </p:txBody>
@@ -6983,7 +8886,7 @@
             <a:pPr algn="ctr"/>
             <a:r>
               <a:rPr lang="en-US" sz="1400" dirty="0"/>
-              <a:t>Processor 2</a:t>
+              <a:t>Process 2</a:t>
             </a:r>
           </a:p>
         </p:txBody>
@@ -7019,7 +8922,7 @@
             <a:pPr algn="ctr"/>
             <a:r>
               <a:rPr lang="en-US" sz="1400" dirty="0"/>
-              <a:t>Processor 3</a:t>
+              <a:t>Process 3</a:t>
             </a:r>
           </a:p>
         </p:txBody>
@@ -7269,7 +9172,7 @@
 </p:sld>
 </file>
 
-<file path=ppt/slides/slide4.xml><?xml version="1.0" encoding="utf-8"?>
+<file path=ppt/slides/slide5.xml><?xml version="1.0" encoding="utf-8"?>
 <p:sld xmlns:a="http://schemas.openxmlformats.org/drawingml/2006/main" xmlns:r="http://schemas.openxmlformats.org/officeDocument/2006/relationships" xmlns:p="http://schemas.openxmlformats.org/presentationml/2006/main">
   <p:cSld>
     <p:spTree>
@@ -8268,7 +10171,7 @@
 </p:sld>
 </file>
 
-<file path=ppt/slides/slide5.xml><?xml version="1.0" encoding="utf-8"?>
+<file path=ppt/slides/slide6.xml><?xml version="1.0" encoding="utf-8"?>
 <p:sld xmlns:a="http://schemas.openxmlformats.org/drawingml/2006/main" xmlns:r="http://schemas.openxmlformats.org/officeDocument/2006/relationships" xmlns:p="http://schemas.openxmlformats.org/presentationml/2006/main">
   <p:cSld>
     <p:spTree>
@@ -9866,7 +11769,7 @@
 </p:sld>
 </file>
 
-<file path=ppt/slides/slide6.xml><?xml version="1.0" encoding="utf-8"?>
+<file path=ppt/slides/slide7.xml><?xml version="1.0" encoding="utf-8"?>
 <p:sld xmlns:a="http://schemas.openxmlformats.org/drawingml/2006/main" xmlns:r="http://schemas.openxmlformats.org/officeDocument/2006/relationships" xmlns:p="http://schemas.openxmlformats.org/presentationml/2006/main">
   <p:cSld>
     <p:spTree>
@@ -10627,8 +12530,8 @@
         </p:nvSpPr>
         <p:spPr>
           <a:xfrm>
-            <a:off x="6040213" y="3553190"/>
-            <a:ext cx="3441539" cy="307777"/>
+            <a:off x="6465888" y="3553190"/>
+            <a:ext cx="2570802" cy="307777"/>
           </a:xfrm>
           <a:prstGeom prst="rect">
             <a:avLst/>
@@ -12287,6 +14190,123 @@
     <p:extLst>
       <p:ext uri="{BB962C8B-B14F-4D97-AF65-F5344CB8AC3E}">
         <p14:creationId xmlns:p14="http://schemas.microsoft.com/office/powerpoint/2010/main" val="1148025495"/>
+      </p:ext>
+    </p:extLst>
+  </p:cSld>
+  <p:clrMapOvr>
+    <a:masterClrMapping/>
+  </p:clrMapOvr>
+</p:sld>
+</file>
+
+<file path=ppt/slides/slide8.xml><?xml version="1.0" encoding="utf-8"?>
+<p:sld xmlns:a="http://schemas.openxmlformats.org/drawingml/2006/main" xmlns:r="http://schemas.openxmlformats.org/officeDocument/2006/relationships" xmlns:p="http://schemas.openxmlformats.org/presentationml/2006/main">
+  <p:cSld>
+    <p:spTree>
+      <p:nvGrpSpPr>
+        <p:cNvPr id="1" name=""/>
+        <p:cNvGrpSpPr/>
+        <p:nvPr/>
+      </p:nvGrpSpPr>
+      <p:grpSpPr>
+        <a:xfrm>
+          <a:off x="0" y="0"/>
+          <a:ext cx="0" cy="0"/>
+          <a:chOff x="0" y="0"/>
+          <a:chExt cx="0" cy="0"/>
+        </a:xfrm>
+      </p:grpSpPr>
+      <p:pic>
+        <p:nvPicPr>
+          <p:cNvPr id="5" name="Picture 4">
+            <a:extLst>
+              <a:ext uri="{FF2B5EF4-FFF2-40B4-BE49-F238E27FC236}">
+                <a16:creationId xmlns:a16="http://schemas.microsoft.com/office/drawing/2014/main" id="{BFCCA3BD-3D9E-4048-87B0-645810BC942A}"/>
+              </a:ext>
+            </a:extLst>
+          </p:cNvPr>
+          <p:cNvPicPr>
+            <a:picLocks noChangeAspect="1"/>
+          </p:cNvPicPr>
+          <p:nvPr/>
+        </p:nvPicPr>
+        <p:blipFill rotWithShape="1">
+          <a:blip r:embed="rId2">
+            <a:extLst>
+              <a:ext uri="{28A0092B-C50C-407E-A947-70E740481C1C}">
+                <a14:useLocalDpi xmlns:a14="http://schemas.microsoft.com/office/drawing/2010/main" val="0"/>
+              </a:ext>
+            </a:extLst>
+          </a:blip>
+          <a:srcRect l="33161" r="33521" b="1553"/>
+          <a:stretch/>
+        </p:blipFill>
+        <p:spPr>
+          <a:xfrm>
+            <a:off x="4906432" y="2673158"/>
+            <a:ext cx="2353735" cy="1488209"/>
+          </a:xfrm>
+          <a:prstGeom prst="rect">
+            <a:avLst/>
+          </a:prstGeom>
+        </p:spPr>
+      </p:pic>
+      <p:sp>
+        <p:nvSpPr>
+          <p:cNvPr id="6" name="Rectangle 5">
+            <a:extLst>
+              <a:ext uri="{FF2B5EF4-FFF2-40B4-BE49-F238E27FC236}">
+                <a16:creationId xmlns:a16="http://schemas.microsoft.com/office/drawing/2014/main" id="{22A4DC8B-15E5-46D2-8094-4D247073483B}"/>
+              </a:ext>
+            </a:extLst>
+          </p:cNvPr>
+          <p:cNvSpPr/>
+          <p:nvPr/>
+        </p:nvSpPr>
+        <p:spPr>
+          <a:xfrm>
+            <a:off x="5118100" y="2844800"/>
+            <a:ext cx="1114425" cy="368300"/>
+          </a:xfrm>
+          <a:prstGeom prst="rect">
+            <a:avLst/>
+          </a:prstGeom>
+          <a:solidFill>
+            <a:schemeClr val="bg1"/>
+          </a:solidFill>
+          <a:ln>
+            <a:noFill/>
+          </a:ln>
+        </p:spPr>
+        <p:style>
+          <a:lnRef idx="2">
+            <a:schemeClr val="accent1">
+              <a:shade val="50000"/>
+            </a:schemeClr>
+          </a:lnRef>
+          <a:fillRef idx="1">
+            <a:schemeClr val="accent1"/>
+          </a:fillRef>
+          <a:effectRef idx="0">
+            <a:schemeClr val="accent1"/>
+          </a:effectRef>
+          <a:fontRef idx="minor">
+            <a:schemeClr val="lt1"/>
+          </a:fontRef>
+        </p:style>
+        <p:txBody>
+          <a:bodyPr rtlCol="0" anchor="ctr"/>
+          <a:lstStyle/>
+          <a:p>
+            <a:pPr algn="ctr"/>
+            <a:endParaRPr lang="en-US"/>
+          </a:p>
+        </p:txBody>
+      </p:sp>
+    </p:spTree>
+    <p:extLst>
+      <p:ext uri="{BB962C8B-B14F-4D97-AF65-F5344CB8AC3E}">
+        <p14:creationId xmlns:p14="http://schemas.microsoft.com/office/powerpoint/2010/main" val="244170258"/>
       </p:ext>
     </p:extLst>
   </p:cSld>

</xml_diff>